<commit_message>
fixed Duration Display added JavaDoc cleaned Code up a Bit final Code commit
</commit_message>
<xml_diff>
--- a/Release 3.pptx
+++ b/Release 3.pptx
@@ -2824,7 +2824,7 @@
 <dgm:dataModel xmlns:dgm="http://schemas.openxmlformats.org/drawingml/2006/diagram" xmlns:a="http://schemas.openxmlformats.org/drawingml/2006/main">
   <dgm:ptLst>
     <dgm:pt modelId="{AB82A22F-F60E-4575-899D-8254A98DE03E}" type="doc">
-      <dgm:prSet loTypeId="urn:microsoft.com/office/officeart/2005/8/layout/hierarchy1" loCatId="hierarchy" qsTypeId="urn:microsoft.com/office/officeart/2005/8/quickstyle/simple2" qsCatId="simple" csTypeId="urn:microsoft.com/office/officeart/2005/8/colors/accent1_2" csCatId="accent1"/>
+      <dgm:prSet loTypeId="urn:microsoft.com/office/officeart/2005/8/layout/hierarchy1" loCatId="hierarchy" qsTypeId="urn:microsoft.com/office/officeart/2005/8/quickstyle/simple2" qsCatId="simple" csTypeId="urn:microsoft.com/office/officeart/2005/8/colors/accent1_2" csCatId="accent1" phldr="1"/>
       <dgm:spPr/>
       <dgm:t>
         <a:bodyPr/>
@@ -2878,9 +2878,50 @@
         <a:lstStyle/>
         <a:p>
           <a:r>
-            <a:rPr lang="en-US"/>
-            <a:t>Projektdokumentation bereits in teilweise fertig, Feedback einfließen lassen</a:t>
+            <a:rPr lang="en-US" dirty="0" err="1"/>
+            <a:t>Projektdokumentation</a:t>
           </a:r>
+          <a:r>
+            <a:rPr lang="en-US" dirty="0"/>
+            <a:t> </a:t>
+          </a:r>
+          <a:r>
+            <a:rPr lang="en-US" dirty="0" err="1"/>
+            <a:t>bereits</a:t>
+          </a:r>
+          <a:r>
+            <a:rPr lang="en-US" dirty="0"/>
+            <a:t> in </a:t>
+          </a:r>
+          <a:r>
+            <a:rPr lang="en-US" dirty="0" err="1"/>
+            <a:t>Teilen</a:t>
+          </a:r>
+          <a:r>
+            <a:rPr lang="en-US" dirty="0"/>
+            <a:t> </a:t>
+          </a:r>
+          <a:r>
+            <a:rPr lang="en-US" dirty="0" err="1"/>
+            <a:t>fertig</a:t>
+          </a:r>
+          <a:r>
+            <a:rPr lang="en-US" dirty="0"/>
+            <a:t>, Feedback </a:t>
+          </a:r>
+          <a:r>
+            <a:rPr lang="en-US" dirty="0" err="1"/>
+            <a:t>einfließen</a:t>
+          </a:r>
+          <a:r>
+            <a:rPr lang="en-US" dirty="0"/>
+            <a:t> </a:t>
+          </a:r>
+          <a:r>
+            <a:rPr lang="en-US" dirty="0" err="1"/>
+            <a:t>lassen</a:t>
+          </a:r>
+          <a:endParaRPr lang="en-US" dirty="0"/>
         </a:p>
       </dgm:t>
     </dgm:pt>
@@ -4380,9 +4421,50 @@
             <a:buNone/>
           </a:pPr>
           <a:r>
-            <a:rPr lang="en-US" sz="2100" kern="1200"/>
-            <a:t>Projektdokumentation bereits in teilweise fertig, Feedback einfließen lassen</a:t>
+            <a:rPr lang="en-US" sz="2100" kern="1200" dirty="0" err="1"/>
+            <a:t>Projektdokumentation</a:t>
           </a:r>
+          <a:r>
+            <a:rPr lang="en-US" sz="2100" kern="1200" dirty="0"/>
+            <a:t> </a:t>
+          </a:r>
+          <a:r>
+            <a:rPr lang="en-US" sz="2100" kern="1200" dirty="0" err="1"/>
+            <a:t>bereits</a:t>
+          </a:r>
+          <a:r>
+            <a:rPr lang="en-US" sz="2100" kern="1200" dirty="0"/>
+            <a:t> in </a:t>
+          </a:r>
+          <a:r>
+            <a:rPr lang="en-US" sz="2100" kern="1200" dirty="0" err="1"/>
+            <a:t>Teilen</a:t>
+          </a:r>
+          <a:r>
+            <a:rPr lang="en-US" sz="2100" kern="1200" dirty="0"/>
+            <a:t> </a:t>
+          </a:r>
+          <a:r>
+            <a:rPr lang="en-US" sz="2100" kern="1200" dirty="0" err="1"/>
+            <a:t>fertig</a:t>
+          </a:r>
+          <a:r>
+            <a:rPr lang="en-US" sz="2100" kern="1200" dirty="0"/>
+            <a:t>, Feedback </a:t>
+          </a:r>
+          <a:r>
+            <a:rPr lang="en-US" sz="2100" kern="1200" dirty="0" err="1"/>
+            <a:t>einfließen</a:t>
+          </a:r>
+          <a:r>
+            <a:rPr lang="en-US" sz="2100" kern="1200" dirty="0"/>
+            <a:t> </a:t>
+          </a:r>
+          <a:r>
+            <a:rPr lang="en-US" sz="2100" kern="1200" dirty="0" err="1"/>
+            <a:t>lassen</a:t>
+          </a:r>
+          <a:endParaRPr lang="en-US" sz="2100" kern="1200" dirty="0"/>
         </a:p>
       </dsp:txBody>
       <dsp:txXfrm>
@@ -9656,7 +9738,7 @@
           <a:p>
             <a:fld id="{BBFC0180-6606-4677-992A-CE6BD818A9B5}" type="datetimeFigureOut">
               <a:rPr lang="en-US" smtClean="0"/>
-              <a:t>6/28/2020</a:t>
+              <a:t>6/30/2020</a:t>
             </a:fld>
             <a:endParaRPr lang="en-US"/>
           </a:p>
@@ -10682,7 +10764,7 @@
           <a:p>
             <a:fld id="{BE7E2238-C31C-464A-BEE7-21A36900E7E0}" type="datetime4">
               <a:rPr lang="en-US" smtClean="0"/>
-              <a:t>June 29, 2020</a:t>
+              <a:t>June 30, 2020</a:t>
             </a:fld>
             <a:endParaRPr lang="en-US" dirty="0"/>
           </a:p>
@@ -11025,7 +11107,7 @@
           <a:p>
             <a:fld id="{B19E88E7-1C29-444A-899C-4A347E1316A1}" type="datetime4">
               <a:rPr lang="en-US" smtClean="0"/>
-              <a:t>June 29, 2020</a:t>
+              <a:t>June 30, 2020</a:t>
             </a:fld>
             <a:endParaRPr lang="en-US" dirty="0"/>
           </a:p>
@@ -11379,7 +11461,7 @@
           <a:p>
             <a:fld id="{46AE1A93-F522-CB4D-8FE8-4E9EB92108D6}" type="datetime4">
               <a:rPr lang="en-US" smtClean="0"/>
-              <a:t>June 29, 2020</a:t>
+              <a:t>June 30, 2020</a:t>
             </a:fld>
             <a:endParaRPr lang="en-US" dirty="0"/>
           </a:p>
@@ -11789,7 +11871,7 @@
           <a:p>
             <a:fld id="{A6690B13-C4E3-BF4E-9729-4E3470F82105}" type="datetime4">
               <a:rPr lang="en-US" smtClean="0"/>
-              <a:t>June 29, 2020</a:t>
+              <a:t>June 30, 2020</a:t>
             </a:fld>
             <a:endParaRPr lang="de-AT" dirty="0"/>
           </a:p>
@@ -12088,7 +12170,7 @@
           <a:p>
             <a:fld id="{2EA166AA-EFEE-3B49-86E6-D4777F283FC6}" type="datetime4">
               <a:rPr lang="en-US" smtClean="0"/>
-              <a:t>June 29, 2020</a:t>
+              <a:t>June 30, 2020</a:t>
             </a:fld>
             <a:endParaRPr lang="en-US" dirty="0"/>
           </a:p>
@@ -12552,7 +12634,7 @@
           <a:p>
             <a:fld id="{A984EE36-6279-2F43-BFBA-518851C537A1}" type="datetime4">
               <a:rPr lang="en-US" smtClean="0"/>
-              <a:t>June 28, 2020</a:t>
+              <a:t>June 30, 2020</a:t>
             </a:fld>
             <a:endParaRPr lang="en-US" dirty="0"/>
           </a:p>
@@ -13022,9 +13104,10 @@
           <a:lstStyle/>
           <a:p>
             <a:r>
-              <a:rPr lang="de-AT" dirty="0"/>
-              <a:t>time Management</a:t>
-            </a:r>
+              <a:rPr lang="de-AT" dirty="0" err="1"/>
+              <a:t>TaskyCompanion</a:t>
+            </a:r>
+            <a:endParaRPr lang="de-AT" dirty="0"/>
           </a:p>
         </p:txBody>
       </p:sp>
@@ -13464,7 +13547,7 @@
           <a:p>
             <a:fld id="{BE7E2238-C31C-464A-BEE7-21A36900E7E0}" type="datetime4">
               <a:rPr lang="en-US" smtClean="0"/>
-              <a:t>June 28, 2020</a:t>
+              <a:t>June 30, 2020</a:t>
             </a:fld>
             <a:endParaRPr lang="en-US" dirty="0"/>
           </a:p>
@@ -13696,7 +13779,7 @@
                   <a:spcPts val="600"/>
                 </a:spcAft>
               </a:pPr>
-              <a:t>June 28, 2020</a:t>
+              <a:t>June 30, 2020</a:t>
             </a:fld>
             <a:endParaRPr lang="en-US"/>
           </a:p>
@@ -13977,7 +14060,7 @@
                   <a:spcPts val="600"/>
                 </a:spcAft>
               </a:pPr>
-              <a:t>June 29, 2020</a:t>
+              <a:t>June 30, 2020</a:t>
             </a:fld>
             <a:endParaRPr lang="en-US" dirty="0"/>
           </a:p>
@@ -14413,7 +14496,7 @@
           <a:p>
             <a:fld id="{BE7E2238-C31C-464A-BEE7-21A36900E7E0}" type="datetime4">
               <a:rPr lang="en-US" smtClean="0"/>
-              <a:t>June 28, 2020</a:t>
+              <a:t>June 30, 2020</a:t>
             </a:fld>
             <a:endParaRPr lang="en-US" dirty="0"/>
           </a:p>
@@ -14648,7 +14731,7 @@
           <a:p>
             <a:fld id="{BE7E2238-C31C-464A-BEE7-21A36900E7E0}" type="datetime4">
               <a:rPr lang="en-US" smtClean="0"/>
-              <a:t>June 28, 2020</a:t>
+              <a:t>June 30, 2020</a:t>
             </a:fld>
             <a:endParaRPr lang="en-US" dirty="0"/>
           </a:p>
@@ -14908,7 +14991,7 @@
           <a:p>
             <a:fld id="{B19E88E7-1C29-444A-899C-4A347E1316A1}" type="datetime4">
               <a:rPr lang="en-US" smtClean="0"/>
-              <a:t>June 29, 2020</a:t>
+              <a:t>June 30, 2020</a:t>
             </a:fld>
             <a:endParaRPr lang="en-US" dirty="0"/>
           </a:p>
@@ -15160,7 +15243,7 @@
           <a:p>
             <a:fld id="{BE7E2238-C31C-464A-BEE7-21A36900E7E0}" type="datetime4">
               <a:rPr lang="en-US" smtClean="0"/>
-              <a:t>June 28, 2020</a:t>
+              <a:t>June 30, 2020</a:t>
             </a:fld>
             <a:endParaRPr lang="en-US" dirty="0"/>
           </a:p>
@@ -15449,7 +15532,7 @@
           <a:p>
             <a:fld id="{BE7E2238-C31C-464A-BEE7-21A36900E7E0}" type="datetime4">
               <a:rPr lang="en-US" smtClean="0"/>
-              <a:t>June 29, 2020</a:t>
+              <a:t>June 30, 2020</a:t>
             </a:fld>
             <a:endParaRPr lang="en-US" dirty="0"/>
           </a:p>
@@ -15751,7 +15834,7 @@
           <a:p>
             <a:fld id="{BE7E2238-C31C-464A-BEE7-21A36900E7E0}" type="datetime4">
               <a:rPr lang="en-US" smtClean="0"/>
-              <a:t>June 28, 2020</a:t>
+              <a:t>June 30, 2020</a:t>
             </a:fld>
             <a:endParaRPr lang="en-US" dirty="0"/>
           </a:p>
@@ -15975,7 +16058,7 @@
                   <a:spcPts val="600"/>
                 </a:spcAft>
               </a:pPr>
-              <a:t>June 28, 2020</a:t>
+              <a:t>June 30, 2020</a:t>
             </a:fld>
             <a:endParaRPr lang="en-US"/>
           </a:p>
@@ -16083,7 +16166,7 @@
             <p:ph idx="1"/>
             <p:extLst>
               <p:ext uri="{D42A27DB-BD31-4B8C-83A1-F6EECF244321}">
-                <p14:modId xmlns:p14="http://schemas.microsoft.com/office/powerpoint/2010/main" val="3493829423"/>
+                <p14:modId xmlns:p14="http://schemas.microsoft.com/office/powerpoint/2010/main" val="2590214488"/>
               </p:ext>
             </p:extLst>
           </p:nvPr>

</xml_diff>